<commit_message>
Moved all notes to PPT
</commit_message>
<xml_diff>
--- a/Section 2 - Getting DevOps into Development/Section2-VCS.pptx
+++ b/Section 2 - Getting DevOps into Development/Section2-VCS.pptx
@@ -5,7 +5,7 @@
     <p:sldMasterId id="2147483648" r:id="rId1"/>
   </p:sldMasterIdLst>
   <p:notesMasterIdLst>
-    <p:notesMasterId r:id="rId22"/>
+    <p:notesMasterId r:id="rId23"/>
   </p:notesMasterIdLst>
   <p:sldIdLst>
     <p:sldId id="256" r:id="rId2"/>
@@ -23,11 +23,12 @@
     <p:sldId id="263" r:id="rId14"/>
     <p:sldId id="270" r:id="rId15"/>
     <p:sldId id="271" r:id="rId16"/>
-    <p:sldId id="264" r:id="rId17"/>
-    <p:sldId id="266" r:id="rId18"/>
-    <p:sldId id="267" r:id="rId19"/>
-    <p:sldId id="272" r:id="rId20"/>
-    <p:sldId id="273" r:id="rId21"/>
+    <p:sldId id="277" r:id="rId17"/>
+    <p:sldId id="264" r:id="rId18"/>
+    <p:sldId id="266" r:id="rId19"/>
+    <p:sldId id="267" r:id="rId20"/>
+    <p:sldId id="272" r:id="rId21"/>
+    <p:sldId id="273" r:id="rId22"/>
   </p:sldIdLst>
   <p:sldSz cx="12192000" cy="6858000"/>
   <p:notesSz cx="6858000" cy="9144000"/>
@@ -706,6 +707,745 @@
 </p:notes>
 </file>
 
+<file path=ppt/notesSlides/notesSlide10.xml><?xml version="1.0" encoding="utf-8"?>
+<p:notes xmlns:a="http://schemas.openxmlformats.org/drawingml/2006/main" xmlns:r="http://schemas.openxmlformats.org/officeDocument/2006/relationships" xmlns:p="http://schemas.openxmlformats.org/presentationml/2006/main">
+  <p:cSld>
+    <p:spTree>
+      <p:nvGrpSpPr>
+        <p:cNvPr id="1" name=""/>
+        <p:cNvGrpSpPr/>
+        <p:nvPr/>
+      </p:nvGrpSpPr>
+      <p:grpSpPr>
+        <a:xfrm>
+          <a:off x="0" y="0"/>
+          <a:ext cx="0" cy="0"/>
+          <a:chOff x="0" y="0"/>
+          <a:chExt cx="0" cy="0"/>
+        </a:xfrm>
+      </p:grpSpPr>
+      <p:sp>
+        <p:nvSpPr>
+          <p:cNvPr id="2" name="Slide Image Placeholder 1"/>
+          <p:cNvSpPr>
+            <a:spLocks noGrp="1" noRot="1" noChangeAspect="1"/>
+          </p:cNvSpPr>
+          <p:nvPr>
+            <p:ph type="sldImg"/>
+          </p:nvPr>
+        </p:nvSpPr>
+        <p:spPr/>
+      </p:sp>
+      <p:sp>
+        <p:nvSpPr>
+          <p:cNvPr id="3" name="Notes Placeholder 2"/>
+          <p:cNvSpPr>
+            <a:spLocks noGrp="1"/>
+          </p:cNvSpPr>
+          <p:nvPr>
+            <p:ph type="body" idx="1"/>
+          </p:nvPr>
+        </p:nvSpPr>
+        <p:spPr/>
+        <p:txBody>
+          <a:bodyPr/>
+          <a:lstStyle/>
+          <a:p>
+            <a:r>
+              <a:rPr lang="en-US" dirty="0"/>
+              <a:t>## Testing our code</a:t>
+            </a:r>
+          </a:p>
+          <a:p>
+            <a:r>
+              <a:rPr lang="en-US" dirty="0"/>
+              <a:t>As with application code, we want to run unit tests, and potentially other types of tests, against our database code. The idea with automating these tests is that we ensure the tests are always run against code that is checked into our system. This avoids the forgetful developer that might not run all the tests, or does not have all the tests on their system.</a:t>
+            </a:r>
+          </a:p>
+          <a:p>
+            <a:endParaRPr lang="en-US" dirty="0"/>
+          </a:p>
+          <a:p>
+            <a:r>
+              <a:rPr lang="en-US" dirty="0"/>
+              <a:t>The idea with using tests in a CI process is that we try to fail the build fast and let developers know there is an issue. How we choose to do this is up to us, but there are a few types of unit tests for your database that you might stage and run in serial or parallel to give a developer quick feedback on their commit.</a:t>
+            </a:r>
+          </a:p>
+          <a:p>
+            <a:endParaRPr lang="en-US" dirty="0"/>
+          </a:p>
+          <a:p>
+            <a:r>
+              <a:rPr lang="en-US" dirty="0"/>
+              <a:t>There are various types of testing, but we will limit CI testing to</a:t>
+            </a:r>
+          </a:p>
+          <a:p>
+            <a:r>
+              <a:rPr lang="en-US" dirty="0"/>
+              <a:t>* Static Code Analysis and Standards Testing</a:t>
+            </a:r>
+          </a:p>
+          <a:p>
+            <a:r>
+              <a:rPr lang="en-US" dirty="0"/>
+              <a:t>* Unit testing</a:t>
+            </a:r>
+          </a:p>
+          <a:p>
+            <a:r>
+              <a:rPr lang="en-US" dirty="0"/>
+              <a:t>* Functional Testing</a:t>
+            </a:r>
+          </a:p>
+          <a:p>
+            <a:r>
+              <a:rPr lang="en-US" dirty="0"/>
+              <a:t>* Performance Testing</a:t>
+            </a:r>
+          </a:p>
+          <a:p>
+            <a:r>
+              <a:rPr lang="en-US" dirty="0"/>
+              <a:t>* Security Testing</a:t>
+            </a:r>
+          </a:p>
+          <a:p>
+            <a:endParaRPr lang="en-US" dirty="0"/>
+          </a:p>
+          <a:p>
+            <a:r>
+              <a:rPr lang="en-US" dirty="0"/>
+              <a:t>We will talk more about testing in the next module, but for now, understand that each of these should be performed at some point in our software development </a:t>
+            </a:r>
+            <a:r>
+              <a:rPr lang="en-US" dirty="0" err="1"/>
+              <a:t>pipline</a:t>
+            </a:r>
+            <a:r>
+              <a:rPr lang="en-US" dirty="0"/>
+              <a:t>. In general, we want to fail the build quickly if there are issues and let the developer know.</a:t>
+            </a:r>
+          </a:p>
+          <a:p>
+            <a:endParaRPr lang="en-US" dirty="0"/>
+          </a:p>
+          <a:p>
+            <a:r>
+              <a:rPr lang="en-US" dirty="0"/>
+              <a:t>Since testing usually needs a database, and some of these types of tests require test data, these are usually performed as a separate build that isn't executed after every commit, but rather at discrete times when we are find application code is ready to release, or the changes may impact the live application. In those cases, we would start another build process that performs the functional, performance or load testing, and security testing of our database.</a:t>
+            </a:r>
+            <a:endParaRPr lang="en-US" dirty="0"/>
+          </a:p>
+        </p:txBody>
+      </p:sp>
+      <p:sp>
+        <p:nvSpPr>
+          <p:cNvPr id="4" name="Slide Number Placeholder 3"/>
+          <p:cNvSpPr>
+            <a:spLocks noGrp="1"/>
+          </p:cNvSpPr>
+          <p:nvPr>
+            <p:ph type="sldNum" sz="quarter" idx="10"/>
+          </p:nvPr>
+        </p:nvSpPr>
+        <p:spPr/>
+        <p:txBody>
+          <a:bodyPr/>
+          <a:lstStyle/>
+          <a:p>
+            <a:fld id="{2D27C7C1-2254-4EED-9675-B1F57C001743}" type="slidenum">
+              <a:rPr lang="en-US" smtClean="0"/>
+              <a:t>16</a:t>
+            </a:fld>
+            <a:endParaRPr lang="en-US"/>
+          </a:p>
+        </p:txBody>
+      </p:sp>
+    </p:spTree>
+    <p:extLst>
+      <p:ext uri="{BB962C8B-B14F-4D97-AF65-F5344CB8AC3E}">
+        <p14:creationId xmlns:p14="http://schemas.microsoft.com/office/powerpoint/2010/main" val="4020849738"/>
+      </p:ext>
+    </p:extLst>
+  </p:cSld>
+  <p:clrMapOvr>
+    <a:masterClrMapping/>
+  </p:clrMapOvr>
+</p:notes>
+</file>
+
+<file path=ppt/notesSlides/notesSlide11.xml><?xml version="1.0" encoding="utf-8"?>
+<p:notes xmlns:a="http://schemas.openxmlformats.org/drawingml/2006/main" xmlns:r="http://schemas.openxmlformats.org/officeDocument/2006/relationships" xmlns:p="http://schemas.openxmlformats.org/presentationml/2006/main">
+  <p:cSld>
+    <p:spTree>
+      <p:nvGrpSpPr>
+        <p:cNvPr id="1" name=""/>
+        <p:cNvGrpSpPr/>
+        <p:nvPr/>
+      </p:nvGrpSpPr>
+      <p:grpSpPr>
+        <a:xfrm>
+          <a:off x="0" y="0"/>
+          <a:ext cx="0" cy="0"/>
+          <a:chOff x="0" y="0"/>
+          <a:chExt cx="0" cy="0"/>
+        </a:xfrm>
+      </p:grpSpPr>
+      <p:sp>
+        <p:nvSpPr>
+          <p:cNvPr id="2" name="Slide Image Placeholder 1"/>
+          <p:cNvSpPr>
+            <a:spLocks noGrp="1" noRot="1" noChangeAspect="1"/>
+          </p:cNvSpPr>
+          <p:nvPr>
+            <p:ph type="sldImg"/>
+          </p:nvPr>
+        </p:nvSpPr>
+        <p:spPr/>
+      </p:sp>
+      <p:sp>
+        <p:nvSpPr>
+          <p:cNvPr id="3" name="Notes Placeholder 2"/>
+          <p:cNvSpPr>
+            <a:spLocks noGrp="1"/>
+          </p:cNvSpPr>
+          <p:nvPr>
+            <p:ph type="body" idx="1"/>
+          </p:nvPr>
+        </p:nvSpPr>
+        <p:spPr/>
+        <p:txBody>
+          <a:bodyPr/>
+          <a:lstStyle/>
+          <a:p>
+            <a:r>
+              <a:rPr lang="en-US" dirty="0"/>
+              <a:t>In the last module we briefly touched on testing, but let's look at this in a little more detail. Testing database code is a bit different than other application code, with some requirements, so let's first talk in more detail about the types of testing we want to perform.</a:t>
+            </a:r>
+          </a:p>
+          <a:p>
+            <a:endParaRPr lang="en-US" dirty="0"/>
+          </a:p>
+          <a:p>
+            <a:r>
+              <a:rPr lang="en-US" dirty="0"/>
+              <a:t>There are a number of types of tests we perform in software development, such as</a:t>
+            </a:r>
+          </a:p>
+          <a:p>
+            <a:r>
+              <a:rPr lang="en-US" dirty="0"/>
+              <a:t>* Static Code Analysis and Standards Testing</a:t>
+            </a:r>
+          </a:p>
+          <a:p>
+            <a:r>
+              <a:rPr lang="en-US" dirty="0"/>
+              <a:t>* Unit testing</a:t>
+            </a:r>
+          </a:p>
+          <a:p>
+            <a:r>
+              <a:rPr lang="en-US" dirty="0"/>
+              <a:t>* Functional Testing</a:t>
+            </a:r>
+          </a:p>
+          <a:p>
+            <a:r>
+              <a:rPr lang="en-US" dirty="0"/>
+              <a:t>* Performance Testing</a:t>
+            </a:r>
+          </a:p>
+          <a:p>
+            <a:r>
+              <a:rPr lang="en-US" dirty="0"/>
+              <a:t>* Security Testing</a:t>
+            </a:r>
+          </a:p>
+          <a:p>
+            <a:endParaRPr lang="en-US" dirty="0"/>
+          </a:p>
+          <a:p>
+            <a:r>
+              <a:rPr lang="en-US" dirty="0"/>
+              <a:t>There may be other types, but typically we want to ensure all our database code is well tested, simple mistakes are caught, and regression bugs are avoided.</a:t>
+            </a:r>
+            <a:endParaRPr lang="en-US" dirty="0"/>
+          </a:p>
+        </p:txBody>
+      </p:sp>
+      <p:sp>
+        <p:nvSpPr>
+          <p:cNvPr id="4" name="Slide Number Placeholder 3"/>
+          <p:cNvSpPr>
+            <a:spLocks noGrp="1"/>
+          </p:cNvSpPr>
+          <p:nvPr>
+            <p:ph type="sldNum" sz="quarter" idx="10"/>
+          </p:nvPr>
+        </p:nvSpPr>
+        <p:spPr/>
+        <p:txBody>
+          <a:bodyPr/>
+          <a:lstStyle/>
+          <a:p>
+            <a:fld id="{2D27C7C1-2254-4EED-9675-B1F57C001743}" type="slidenum">
+              <a:rPr lang="en-US" smtClean="0"/>
+              <a:t>18</a:t>
+            </a:fld>
+            <a:endParaRPr lang="en-US"/>
+          </a:p>
+        </p:txBody>
+      </p:sp>
+    </p:spTree>
+    <p:extLst>
+      <p:ext uri="{BB962C8B-B14F-4D97-AF65-F5344CB8AC3E}">
+        <p14:creationId xmlns:p14="http://schemas.microsoft.com/office/powerpoint/2010/main" val="954921218"/>
+      </p:ext>
+    </p:extLst>
+  </p:cSld>
+  <p:clrMapOvr>
+    <a:masterClrMapping/>
+  </p:clrMapOvr>
+</p:notes>
+</file>
+
+<file path=ppt/notesSlides/notesSlide12.xml><?xml version="1.0" encoding="utf-8"?>
+<p:notes xmlns:a="http://schemas.openxmlformats.org/drawingml/2006/main" xmlns:r="http://schemas.openxmlformats.org/officeDocument/2006/relationships" xmlns:p="http://schemas.openxmlformats.org/presentationml/2006/main">
+  <p:cSld>
+    <p:spTree>
+      <p:nvGrpSpPr>
+        <p:cNvPr id="1" name=""/>
+        <p:cNvGrpSpPr/>
+        <p:nvPr/>
+      </p:nvGrpSpPr>
+      <p:grpSpPr>
+        <a:xfrm>
+          <a:off x="0" y="0"/>
+          <a:ext cx="0" cy="0"/>
+          <a:chOff x="0" y="0"/>
+          <a:chExt cx="0" cy="0"/>
+        </a:xfrm>
+      </p:grpSpPr>
+      <p:sp>
+        <p:nvSpPr>
+          <p:cNvPr id="2" name="Slide Image Placeholder 1"/>
+          <p:cNvSpPr>
+            <a:spLocks noGrp="1" noRot="1" noChangeAspect="1"/>
+          </p:cNvSpPr>
+          <p:nvPr>
+            <p:ph type="sldImg"/>
+          </p:nvPr>
+        </p:nvSpPr>
+        <p:spPr/>
+      </p:sp>
+      <p:sp>
+        <p:nvSpPr>
+          <p:cNvPr id="3" name="Notes Placeholder 2"/>
+          <p:cNvSpPr>
+            <a:spLocks noGrp="1"/>
+          </p:cNvSpPr>
+          <p:nvPr>
+            <p:ph type="body" idx="1"/>
+          </p:nvPr>
+        </p:nvSpPr>
+        <p:spPr/>
+        <p:txBody>
+          <a:bodyPr/>
+          <a:lstStyle/>
+          <a:p>
+            <a:r>
+              <a:rPr lang="en-US" dirty="0"/>
+              <a:t>## Standards tests and Static Code Analysis Tests</a:t>
+            </a:r>
+          </a:p>
+          <a:p>
+            <a:r>
+              <a:rPr lang="en-US" dirty="0"/>
+              <a:t>One thing that can help ensure your code is easier for your developers to work on is ensuring that the code adheres to certain standards. These might be the requirement that certain names are used, certain structures aren't allowed (such as cursors), or perhaps indexes are required.</a:t>
+            </a:r>
+          </a:p>
+          <a:p>
+            <a:endParaRPr lang="en-US" dirty="0"/>
+          </a:p>
+          <a:p>
+            <a:r>
+              <a:rPr lang="en-US" dirty="0"/>
+              <a:t>The idea with these tests is that the code isn't executed, but examined for structural issues. Some of these tests might require the actual database to be built to check the code, but since we do that in the build stage of our CI process, this isn't an issue.</a:t>
+            </a:r>
+          </a:p>
+          <a:p>
+            <a:endParaRPr lang="en-US" dirty="0"/>
+          </a:p>
+          <a:p>
+            <a:r>
+              <a:rPr lang="en-US" dirty="0"/>
+              <a:t>I like to run these tests first, as a first test step that should complete very quickly. If a developer has failed to run these tests on their code, we catch these simple issues quickly, informing the developer of a silly mistake. Over time, as developers learn to code according to the standards and design patterns our organization prefers, these test will likely always pass.</a:t>
+            </a:r>
+          </a:p>
+          <a:p>
+            <a:endParaRPr lang="en-US" dirty="0"/>
+          </a:p>
+          <a:p>
+            <a:r>
+              <a:rPr lang="en-US" dirty="0"/>
+              <a:t>There aren't many static analysis tools available, though I hope that this will change. SQL </a:t>
+            </a:r>
+            <a:r>
+              <a:rPr lang="en-US" dirty="0" err="1"/>
+              <a:t>Englight</a:t>
+            </a:r>
+            <a:r>
+              <a:rPr lang="en-US" dirty="0"/>
+              <a:t> and SQL Code Guard are the two I know of commercially, and </a:t>
+            </a:r>
+            <a:r>
+              <a:rPr lang="en-US" dirty="0" err="1"/>
+              <a:t>SQLCop</a:t>
+            </a:r>
+            <a:r>
+              <a:rPr lang="en-US" dirty="0"/>
+              <a:t> is an open source project.</a:t>
+            </a:r>
+          </a:p>
+          <a:p>
+            <a:endParaRPr lang="en-US" dirty="0"/>
+          </a:p>
+          <a:p>
+            <a:r>
+              <a:rPr lang="en-US" dirty="0"/>
+              <a:t>One note I'll make for these types of tests. You need to have the ability to create exceptions for some of these tests. For example, every table should have a primary key, and that's a good test to implement as a static code analysis tests. However, there are reasons to build a table that doesn't have a primary key, for example, for auditing or ETL work. If there is a valid reason to not enforce a PK, then we should have the ability to add an </a:t>
+            </a:r>
+            <a:r>
+              <a:rPr lang="en-US" dirty="0" err="1"/>
+              <a:t>exeption</a:t>
+            </a:r>
+            <a:r>
+              <a:rPr lang="en-US" dirty="0"/>
+              <a:t> to a test. I've written an article with more technical details on the subject: [Adding PK Exceptions to </a:t>
+            </a:r>
+            <a:r>
+              <a:rPr lang="en-US" dirty="0" err="1"/>
+              <a:t>SQLCop</a:t>
+            </a:r>
+            <a:r>
+              <a:rPr lang="en-US" dirty="0"/>
+              <a:t> Tests](http://www.sqlservercentral.com/articles/tSQLt/127634/)</a:t>
+            </a:r>
+          </a:p>
+          <a:p>
+            <a:endParaRPr lang="en-US" dirty="0"/>
+          </a:p>
+        </p:txBody>
+      </p:sp>
+      <p:sp>
+        <p:nvSpPr>
+          <p:cNvPr id="4" name="Slide Number Placeholder 3"/>
+          <p:cNvSpPr>
+            <a:spLocks noGrp="1"/>
+          </p:cNvSpPr>
+          <p:nvPr>
+            <p:ph type="sldNum" sz="quarter" idx="10"/>
+          </p:nvPr>
+        </p:nvSpPr>
+        <p:spPr/>
+        <p:txBody>
+          <a:bodyPr/>
+          <a:lstStyle/>
+          <a:p>
+            <a:fld id="{2D27C7C1-2254-4EED-9675-B1F57C001743}" type="slidenum">
+              <a:rPr lang="en-US" smtClean="0"/>
+              <a:t>19</a:t>
+            </a:fld>
+            <a:endParaRPr lang="en-US"/>
+          </a:p>
+        </p:txBody>
+      </p:sp>
+    </p:spTree>
+    <p:extLst>
+      <p:ext uri="{BB962C8B-B14F-4D97-AF65-F5344CB8AC3E}">
+        <p14:creationId xmlns:p14="http://schemas.microsoft.com/office/powerpoint/2010/main" val="2126875551"/>
+      </p:ext>
+    </p:extLst>
+  </p:cSld>
+  <p:clrMapOvr>
+    <a:masterClrMapping/>
+  </p:clrMapOvr>
+</p:notes>
+</file>
+
+<file path=ppt/notesSlides/notesSlide13.xml><?xml version="1.0" encoding="utf-8"?>
+<p:notes xmlns:a="http://schemas.openxmlformats.org/drawingml/2006/main" xmlns:r="http://schemas.openxmlformats.org/officeDocument/2006/relationships" xmlns:p="http://schemas.openxmlformats.org/presentationml/2006/main">
+  <p:cSld>
+    <p:spTree>
+      <p:nvGrpSpPr>
+        <p:cNvPr id="1" name=""/>
+        <p:cNvGrpSpPr/>
+        <p:nvPr/>
+      </p:nvGrpSpPr>
+      <p:grpSpPr>
+        <a:xfrm>
+          <a:off x="0" y="0"/>
+          <a:ext cx="0" cy="0"/>
+          <a:chOff x="0" y="0"/>
+          <a:chExt cx="0" cy="0"/>
+        </a:xfrm>
+      </p:grpSpPr>
+      <p:sp>
+        <p:nvSpPr>
+          <p:cNvPr id="2" name="Slide Image Placeholder 1"/>
+          <p:cNvSpPr>
+            <a:spLocks noGrp="1" noRot="1" noChangeAspect="1"/>
+          </p:cNvSpPr>
+          <p:nvPr>
+            <p:ph type="sldImg"/>
+          </p:nvPr>
+        </p:nvSpPr>
+        <p:spPr/>
+      </p:sp>
+      <p:sp>
+        <p:nvSpPr>
+          <p:cNvPr id="3" name="Notes Placeholder 2"/>
+          <p:cNvSpPr>
+            <a:spLocks noGrp="1"/>
+          </p:cNvSpPr>
+          <p:nvPr>
+            <p:ph type="body" idx="1"/>
+          </p:nvPr>
+        </p:nvSpPr>
+        <p:spPr/>
+        <p:txBody>
+          <a:bodyPr/>
+          <a:lstStyle/>
+          <a:p>
+            <a:r>
+              <a:rPr lang="en-US" dirty="0"/>
+              <a:t>## Unit Tests</a:t>
+            </a:r>
+          </a:p>
+          <a:p>
+            <a:r>
+              <a:rPr lang="en-US" dirty="0"/>
+              <a:t>The idea with unit tests is that we are actually testing that our code works correctly. This is important in our application code, and it can be important in our database code as well.</a:t>
+            </a:r>
+          </a:p>
+          <a:p>
+            <a:endParaRPr lang="en-US" dirty="0"/>
+          </a:p>
+          <a:p>
+            <a:r>
+              <a:rPr lang="en-US" dirty="0"/>
+              <a:t>Since some of our database code is for static objects, such as tables and views, and some is programmatic (functions, stored procedures), we might structure our tests a little differently than we would with application code.</a:t>
+            </a:r>
+          </a:p>
+          <a:p>
+            <a:endParaRPr lang="en-US" dirty="0"/>
+          </a:p>
+          <a:p>
+            <a:r>
+              <a:rPr lang="en-US" dirty="0"/>
+              <a:t>For our tables and views, we often test one of two things. One is that certain referential integrity options exist, and the second is that the API these objects present to our application, which is essentially what their structure creates.</a:t>
+            </a:r>
+          </a:p>
+          <a:p>
+            <a:endParaRPr lang="en-US" dirty="0"/>
+          </a:p>
+          <a:p>
+            <a:r>
+              <a:rPr lang="en-US" dirty="0"/>
+              <a:t>Referential integrity items are those characteristics of our objects. For tables this might be that defaults exist for columns, or that our child table data must have parent rows, or even that computed columns work as expected. For views, we may check on column transformations or even that insert/updates of views work correctly. </a:t>
+            </a:r>
+          </a:p>
+          <a:p>
+            <a:endParaRPr lang="en-US" dirty="0"/>
+          </a:p>
+          <a:p>
+            <a:r>
+              <a:rPr lang="en-US" dirty="0"/>
+              <a:t>Note that we might define referential integrity explicitly, or we may assume that our other code enforces it. In either case, we want to have tests that ensure that anything we need to ensure that must occur in our data structures actually works.</a:t>
+            </a:r>
+          </a:p>
+          <a:p>
+            <a:endParaRPr lang="en-US" dirty="0"/>
+          </a:p>
+          <a:p>
+            <a:r>
+              <a:rPr lang="en-US" dirty="0"/>
+              <a:t>For our functions and stored procedures, we write tests as we would for an application method or function. We can assemble an environment of tables, variables, and data, then run our stored procedure or function, and finally asserting some fact. Each test should pass or fail based on the requirements of that test.</a:t>
+            </a:r>
+          </a:p>
+          <a:p>
+            <a:endParaRPr lang="en-US" dirty="0"/>
+          </a:p>
+          <a:p>
+            <a:r>
+              <a:rPr lang="en-US" dirty="0"/>
+              <a:t>One final note on testing. We typically need test data in order to run our tests. This makes sense as we're testing the database here. We can assemble test data in each unit test, which is what some people prefer, or you can ensure you have a known set of test data that is always added to your CI process. We will discuss test data more in another module, but for now be aware that we want some test data. However, at the end of every test, we should undo any of our work, which usually means creating a transaction at the start of a test and then rolling back that transaction at the end.</a:t>
+            </a:r>
+            <a:endParaRPr lang="en-US" dirty="0"/>
+          </a:p>
+        </p:txBody>
+      </p:sp>
+      <p:sp>
+        <p:nvSpPr>
+          <p:cNvPr id="4" name="Slide Number Placeholder 3"/>
+          <p:cNvSpPr>
+            <a:spLocks noGrp="1"/>
+          </p:cNvSpPr>
+          <p:nvPr>
+            <p:ph type="sldNum" sz="quarter" idx="10"/>
+          </p:nvPr>
+        </p:nvSpPr>
+        <p:spPr/>
+        <p:txBody>
+          <a:bodyPr/>
+          <a:lstStyle/>
+          <a:p>
+            <a:fld id="{2D27C7C1-2254-4EED-9675-B1F57C001743}" type="slidenum">
+              <a:rPr lang="en-US" smtClean="0"/>
+              <a:t>20</a:t>
+            </a:fld>
+            <a:endParaRPr lang="en-US"/>
+          </a:p>
+        </p:txBody>
+      </p:sp>
+    </p:spTree>
+    <p:extLst>
+      <p:ext uri="{BB962C8B-B14F-4D97-AF65-F5344CB8AC3E}">
+        <p14:creationId xmlns:p14="http://schemas.microsoft.com/office/powerpoint/2010/main" val="1566696542"/>
+      </p:ext>
+    </p:extLst>
+  </p:cSld>
+  <p:clrMapOvr>
+    <a:masterClrMapping/>
+  </p:clrMapOvr>
+</p:notes>
+</file>
+
+<file path=ppt/notesSlides/notesSlide14.xml><?xml version="1.0" encoding="utf-8"?>
+<p:notes xmlns:a="http://schemas.openxmlformats.org/drawingml/2006/main" xmlns:r="http://schemas.openxmlformats.org/officeDocument/2006/relationships" xmlns:p="http://schemas.openxmlformats.org/presentationml/2006/main">
+  <p:cSld>
+    <p:spTree>
+      <p:nvGrpSpPr>
+        <p:cNvPr id="1" name=""/>
+        <p:cNvGrpSpPr/>
+        <p:nvPr/>
+      </p:nvGrpSpPr>
+      <p:grpSpPr>
+        <a:xfrm>
+          <a:off x="0" y="0"/>
+          <a:ext cx="0" cy="0"/>
+          <a:chOff x="0" y="0"/>
+          <a:chExt cx="0" cy="0"/>
+        </a:xfrm>
+      </p:grpSpPr>
+      <p:sp>
+        <p:nvSpPr>
+          <p:cNvPr id="2" name="Slide Image Placeholder 1"/>
+          <p:cNvSpPr>
+            <a:spLocks noGrp="1" noRot="1" noChangeAspect="1"/>
+          </p:cNvSpPr>
+          <p:nvPr>
+            <p:ph type="sldImg"/>
+          </p:nvPr>
+        </p:nvSpPr>
+        <p:spPr/>
+      </p:sp>
+      <p:sp>
+        <p:nvSpPr>
+          <p:cNvPr id="3" name="Notes Placeholder 2"/>
+          <p:cNvSpPr>
+            <a:spLocks noGrp="1"/>
+          </p:cNvSpPr>
+          <p:nvPr>
+            <p:ph type="body" idx="1"/>
+          </p:nvPr>
+        </p:nvSpPr>
+        <p:spPr/>
+        <p:txBody>
+          <a:bodyPr/>
+          <a:lstStyle/>
+          <a:p>
+            <a:r>
+              <a:rPr lang="en-US" dirty="0"/>
+              <a:t>## Other Tests</a:t>
+            </a:r>
+          </a:p>
+          <a:p>
+            <a:r>
+              <a:rPr lang="en-US" dirty="0"/>
+              <a:t>We certainly should have other types of tests defined beyond these two types. Our application should be tested with the database at some point, we should have larger, functional tests that might examine multiple parts of database code working together, perhaps testing a stored procedure that calls other stored procedures or functions and verifying the entire process works. We want performance or load tests run with production sized, or ever larger, sets of data. There should be security tests to ensure that we are not granting more access to data than necessary. This last set of tests are probably the most important in today's world, but also the least likely to be run in most development teams. I hope that changes in the future.</a:t>
+            </a:r>
+          </a:p>
+          <a:p>
+            <a:endParaRPr lang="en-US" dirty="0"/>
+          </a:p>
+          <a:p>
+            <a:r>
+              <a:rPr lang="en-US" dirty="0"/>
+              <a:t>We should automate as many of these tests as we can. They can be executed after successful completion of earlier sets or tests or left in separate build pipelines that must be manually executed. We may choose to run some of these tests less frequently than we run unit tests, but we do want to run these regularly to determine the health of our codebase.</a:t>
+            </a:r>
+          </a:p>
+          <a:p>
+            <a:endParaRPr lang="en-US" dirty="0"/>
+          </a:p>
+          <a:p>
+            <a:r>
+              <a:rPr lang="en-US" dirty="0"/>
+              <a:t>We will discuss additional testing a bit more in a later section.</a:t>
+            </a:r>
+          </a:p>
+          <a:p>
+            <a:endParaRPr lang="en-US" dirty="0"/>
+          </a:p>
+          <a:p>
+            <a:r>
+              <a:rPr lang="en-US" dirty="0"/>
+              <a:t>One final note on testing is that 100% test coverage is unlikely for most development teams. However, at the very least you should be creating tests for each issue or bug raised with your team. This will ensure you are writing tests for the common mistakes your team makes.</a:t>
+            </a:r>
+          </a:p>
+          <a:p>
+            <a:endParaRPr lang="en-US" dirty="0"/>
+          </a:p>
+        </p:txBody>
+      </p:sp>
+      <p:sp>
+        <p:nvSpPr>
+          <p:cNvPr id="4" name="Slide Number Placeholder 3"/>
+          <p:cNvSpPr>
+            <a:spLocks noGrp="1"/>
+          </p:cNvSpPr>
+          <p:nvPr>
+            <p:ph type="sldNum" sz="quarter" idx="10"/>
+          </p:nvPr>
+        </p:nvSpPr>
+        <p:spPr/>
+        <p:txBody>
+          <a:bodyPr/>
+          <a:lstStyle/>
+          <a:p>
+            <a:fld id="{2D27C7C1-2254-4EED-9675-B1F57C001743}" type="slidenum">
+              <a:rPr lang="en-US" smtClean="0"/>
+              <a:t>21</a:t>
+            </a:fld>
+            <a:endParaRPr lang="en-US"/>
+          </a:p>
+        </p:txBody>
+      </p:sp>
+    </p:spTree>
+    <p:extLst>
+      <p:ext uri="{BB962C8B-B14F-4D97-AF65-F5344CB8AC3E}">
+        <p14:creationId xmlns:p14="http://schemas.microsoft.com/office/powerpoint/2010/main" val="1841994924"/>
+      </p:ext>
+    </p:extLst>
+  </p:cSld>
+  <p:clrMapOvr>
+    <a:masterClrMapping/>
+  </p:clrMapOvr>
+</p:notes>
+</file>
+
 <file path=ppt/notesSlides/notesSlide2.xml><?xml version="1.0" encoding="utf-8"?>
 <p:notes xmlns:a="http://schemas.openxmlformats.org/drawingml/2006/main" xmlns:r="http://schemas.openxmlformats.org/officeDocument/2006/relationships" xmlns:p="http://schemas.openxmlformats.org/presentationml/2006/main">
   <p:cSld>
@@ -989,7 +1729,6 @@
               <a:rPr lang="en-US" dirty="0"/>
               <a:t>However, this does mean that you need to organize your code somehow and properly name the objects. One way to do this is shown on the slide. This is what SSMS will generate for you when you script out each object in your database to a separate file. This becomes confusing quickly, especially in a manual process as the naming of the object includes the type. When trying to find a particular type of object to edit, this can be cumbersome for the developer.</a:t>
             </a:r>
-            <a:endParaRPr lang="en-US" dirty="0"/>
           </a:p>
         </p:txBody>
       </p:sp>
@@ -1085,7 +1824,6 @@
               <a:rPr lang="en-US" dirty="0"/>
               <a:t> and auditing) with subfolders for each type of object and then a single .SQL file that is named for the object. Other items, such as users and roles, are stored under the "Security" folder at the top level.</a:t>
             </a:r>
-            <a:endParaRPr lang="en-US" dirty="0"/>
           </a:p>
         </p:txBody>
       </p:sp>
@@ -1173,7 +1911,6 @@
               <a:rPr lang="en-US" dirty="0"/>
               <a:t>Yet another way to manage your code is include all the objects at the top level, as shown here. This is how SQL Source Control from Redgate will setup a repository. In addition to the various SQL Server objects, there are Data and Custom Scripts folders to keep additional code.</a:t>
             </a:r>
-            <a:endParaRPr lang="en-US" dirty="0"/>
           </a:p>
         </p:txBody>
       </p:sp>
@@ -1427,7 +2164,6 @@
               <a:rPr lang="en-US" dirty="0"/>
               <a:t>First, the compile process requires that we ensure our entire set of code actually compiles. We can do that in two ways, depending on our development model. Let's look at each of these.</a:t>
             </a:r>
-            <a:endParaRPr lang="en-US" dirty="0"/>
           </a:p>
         </p:txBody>
       </p:sp>
@@ -1553,7 +2289,6 @@
               <a:rPr lang="en-US" dirty="0"/>
               <a:t>In the case of migration scripts for all our changes, all the scripts need to be run, from the first to the last. Again, this mimics the actual actions taken during development, and ensures that our scripts will correctly build a database.</a:t>
             </a:r>
-            <a:endParaRPr lang="en-US" dirty="0"/>
           </a:p>
         </p:txBody>
       </p:sp>
@@ -4988,30 +5723,79 @@
       </p:grpSpPr>
       <p:sp>
         <p:nvSpPr>
-          <p:cNvPr id="4" name="Title 3"/>
-          <p:cNvSpPr>
-            <a:spLocks noGrp="1"/>
-          </p:cNvSpPr>
-          <p:nvPr>
-            <p:ph type="ctrTitle"/>
-          </p:nvPr>
-        </p:nvSpPr>
-        <p:spPr/>
-        <p:txBody>
-          <a:bodyPr/>
-          <a:lstStyle/>
-          <a:p>
-            <a:r>
-              <a:rPr lang="en-US" dirty="0"/>
-              <a:t>2.4 – Continuous Testing</a:t>
-            </a:r>
+          <p:cNvPr id="2" name="Title 1"/>
+          <p:cNvSpPr>
+            <a:spLocks noGrp="1"/>
+          </p:cNvSpPr>
+          <p:nvPr>
+            <p:ph type="title"/>
+          </p:nvPr>
+        </p:nvSpPr>
+        <p:spPr/>
+        <p:txBody>
+          <a:bodyPr/>
+          <a:lstStyle/>
+          <a:p>
+            <a:r>
+              <a:rPr lang="en-US" dirty="0"/>
+              <a:t>Testing Code</a:t>
+            </a:r>
+          </a:p>
+        </p:txBody>
+      </p:sp>
+      <p:sp>
+        <p:nvSpPr>
+          <p:cNvPr id="3" name="Content Placeholder 2"/>
+          <p:cNvSpPr>
+            <a:spLocks noGrp="1"/>
+          </p:cNvSpPr>
+          <p:nvPr>
+            <p:ph idx="1"/>
+          </p:nvPr>
+        </p:nvSpPr>
+        <p:spPr/>
+        <p:txBody>
+          <a:bodyPr/>
+          <a:lstStyle/>
+          <a:p>
+            <a:r>
+              <a:rPr lang="en-US" dirty="0"/>
+              <a:t>Static Code Analysis and Standards Testing</a:t>
+            </a:r>
+          </a:p>
+          <a:p>
+            <a:r>
+              <a:rPr lang="en-US" dirty="0"/>
+              <a:t>Unit testing</a:t>
+            </a:r>
+          </a:p>
+          <a:p>
+            <a:r>
+              <a:rPr lang="en-US" dirty="0"/>
+              <a:t>Functional Testing</a:t>
+            </a:r>
+          </a:p>
+          <a:p>
+            <a:r>
+              <a:rPr lang="en-US" dirty="0"/>
+              <a:t>Performance Testing</a:t>
+            </a:r>
+          </a:p>
+          <a:p>
+            <a:r>
+              <a:rPr lang="en-US" dirty="0"/>
+              <a:t>Security Testing</a:t>
+            </a:r>
+          </a:p>
+          <a:p>
+            <a:endParaRPr lang="en-US" dirty="0"/>
           </a:p>
         </p:txBody>
       </p:sp>
     </p:spTree>
     <p:extLst>
       <p:ext uri="{BB962C8B-B14F-4D97-AF65-F5344CB8AC3E}">
-        <p14:creationId xmlns:p14="http://schemas.microsoft.com/office/powerpoint/2010/main" val="264652084"/>
+        <p14:creationId xmlns:p14="http://schemas.microsoft.com/office/powerpoint/2010/main" val="3514924035"/>
       </p:ext>
     </p:extLst>
   </p:cSld>
@@ -5040,68 +5824,22 @@
       </p:grpSpPr>
       <p:sp>
         <p:nvSpPr>
-          <p:cNvPr id="2" name="Title 1"/>
-          <p:cNvSpPr>
-            <a:spLocks noGrp="1"/>
-          </p:cNvSpPr>
-          <p:nvPr>
-            <p:ph type="title"/>
-          </p:nvPr>
-        </p:nvSpPr>
-        <p:spPr/>
-        <p:txBody>
-          <a:bodyPr/>
-          <a:lstStyle/>
-          <a:p>
-            <a:r>
-              <a:rPr lang="en-US" dirty="0"/>
-              <a:t>Testing in Database Continuous Integration</a:t>
-            </a:r>
-          </a:p>
-        </p:txBody>
-      </p:sp>
-      <p:sp>
-        <p:nvSpPr>
-          <p:cNvPr id="3" name="Content Placeholder 2"/>
-          <p:cNvSpPr>
-            <a:spLocks noGrp="1"/>
-          </p:cNvSpPr>
-          <p:nvPr>
-            <p:ph idx="1"/>
-          </p:nvPr>
-        </p:nvSpPr>
-        <p:spPr/>
-        <p:txBody>
-          <a:bodyPr/>
-          <a:lstStyle/>
-          <a:p>
-            <a:r>
-              <a:rPr lang="en-US" dirty="0"/>
-              <a:t>Standards and Static Code Analysis</a:t>
-            </a:r>
-          </a:p>
-          <a:p>
-            <a:r>
-              <a:rPr lang="en-US" dirty="0"/>
-              <a:t>Unit Tests</a:t>
-            </a:r>
-          </a:p>
-          <a:p>
-            <a:r>
-              <a:rPr lang="en-US" dirty="0"/>
-              <a:t>Functional Testing</a:t>
-            </a:r>
-          </a:p>
-          <a:p>
-            <a:r>
-              <a:rPr lang="en-US" dirty="0"/>
-              <a:t>Performance Testing</a:t>
-            </a:r>
-          </a:p>
-          <a:p>
-            <a:r>
-              <a:rPr lang="en-US" dirty="0"/>
-              <a:t>Security Testing</a:t>
+          <p:cNvPr id="4" name="Title 3"/>
+          <p:cNvSpPr>
+            <a:spLocks noGrp="1"/>
+          </p:cNvSpPr>
+          <p:nvPr>
+            <p:ph type="ctrTitle"/>
+          </p:nvPr>
+        </p:nvSpPr>
+        <p:spPr/>
+        <p:txBody>
+          <a:bodyPr/>
+          <a:lstStyle/>
+          <a:p>
+            <a:r>
+              <a:rPr lang="en-US" dirty="0"/>
+              <a:t>2.4 – Continuous Testing</a:t>
             </a:r>
           </a:p>
         </p:txBody>
@@ -5109,7 +5847,7 @@
     </p:spTree>
     <p:extLst>
       <p:ext uri="{BB962C8B-B14F-4D97-AF65-F5344CB8AC3E}">
-        <p14:creationId xmlns:p14="http://schemas.microsoft.com/office/powerpoint/2010/main" val="575774470"/>
+        <p14:creationId xmlns:p14="http://schemas.microsoft.com/office/powerpoint/2010/main" val="264652084"/>
       </p:ext>
     </p:extLst>
   </p:cSld>
@@ -5153,7 +5891,7 @@
           <a:p>
             <a:r>
               <a:rPr lang="en-US" dirty="0"/>
-              <a:t>Standards and Static Code Analysis Tests</a:t>
+              <a:t>Testing in Database Continuous Integration</a:t>
             </a:r>
           </a:p>
         </p:txBody>
@@ -5175,75 +5913,31 @@
           <a:p>
             <a:r>
               <a:rPr lang="en-US" dirty="0"/>
-              <a:t>These are tests to ensure that code is consistent.</a:t>
-            </a:r>
-          </a:p>
-          <a:p>
-            <a:r>
-              <a:rPr lang="en-US" dirty="0"/>
-              <a:t>Can include naming, DRI, index requirements, poor programming patterns and more. </a:t>
-            </a:r>
-          </a:p>
-          <a:p>
-            <a:r>
-              <a:rPr lang="en-US" dirty="0"/>
-              <a:t>Testing Tools</a:t>
-            </a:r>
-          </a:p>
-          <a:p>
-            <a:pPr lvl="1"/>
-            <a:r>
-              <a:rPr lang="en-US" dirty="0"/>
-              <a:t>SQL Cop -  </a:t>
-            </a:r>
-            <a:r>
-              <a:rPr lang="en-US" dirty="0">
-                <a:hlinkClick r:id="rId2"/>
-              </a:rPr>
-              <a:t>http://sqlcop.lessthandot.com/</a:t>
-            </a:r>
-            <a:r>
-              <a:rPr lang="en-US" dirty="0"/>
-              <a:t> </a:t>
-            </a:r>
-          </a:p>
-          <a:p>
-            <a:pPr lvl="1"/>
-            <a:r>
-              <a:rPr lang="en-US" dirty="0"/>
-              <a:t>SQL Code Guard - </a:t>
-            </a:r>
-            <a:r>
-              <a:rPr lang="en-US" dirty="0">
-                <a:hlinkClick r:id="rId3"/>
-              </a:rPr>
-              <a:t>https://sqlcodeguard.com/</a:t>
-            </a:r>
-            <a:endParaRPr lang="en-US" dirty="0"/>
-          </a:p>
-          <a:p>
-            <a:pPr lvl="1"/>
-            <a:r>
-              <a:rPr lang="en-US" dirty="0"/>
-              <a:t>SQL </a:t>
-            </a:r>
-            <a:r>
-              <a:rPr lang="en-US" dirty="0" err="1"/>
-              <a:t>Enlight</a:t>
-            </a:r>
-            <a:r>
-              <a:rPr lang="en-US" dirty="0"/>
-              <a:t> - </a:t>
-            </a:r>
-            <a:r>
-              <a:rPr lang="en-US" dirty="0">
-                <a:hlinkClick r:id="rId4"/>
-              </a:rPr>
-              <a:t>http://www.ubitsoft.com/products/sqlenlight/</a:t>
-            </a:r>
-            <a:r>
-              <a:rPr lang="en-US" dirty="0"/>
-              <a:t> </a:t>
+              <a:t>Standards and Static Code Analysis</a:t>
+            </a:r>
+          </a:p>
+          <a:p>
+            <a:r>
+              <a:rPr lang="en-US" dirty="0"/>
+              <a:t>Unit Tests</a:t>
+            </a:r>
+          </a:p>
+          <a:p>
+            <a:r>
+              <a:rPr lang="en-US" dirty="0"/>
+              <a:t>Functional Testing</a:t>
+            </a:r>
+          </a:p>
+          <a:p>
+            <a:r>
+              <a:rPr lang="en-US" dirty="0"/>
+              <a:t>Performance Testing</a:t>
+            </a:r>
+          </a:p>
+          <a:p>
+            <a:r>
+              <a:rPr lang="en-US" dirty="0"/>
+              <a:t>Security Testing</a:t>
             </a:r>
           </a:p>
         </p:txBody>
@@ -5251,7 +5945,7 @@
     </p:spTree>
     <p:extLst>
       <p:ext uri="{BB962C8B-B14F-4D97-AF65-F5344CB8AC3E}">
-        <p14:creationId xmlns:p14="http://schemas.microsoft.com/office/powerpoint/2010/main" val="3624326952"/>
+        <p14:creationId xmlns:p14="http://schemas.microsoft.com/office/powerpoint/2010/main" val="575774470"/>
       </p:ext>
     </p:extLst>
   </p:cSld>
@@ -5295,7 +5989,7 @@
           <a:p>
             <a:r>
               <a:rPr lang="en-US" dirty="0"/>
-              <a:t>Unit Tests</a:t>
+              <a:t>Standards and Static Code Analysis Tests</a:t>
             </a:r>
           </a:p>
         </p:txBody>
@@ -5317,53 +6011,83 @@
           <a:p>
             <a:r>
               <a:rPr lang="en-US" dirty="0"/>
-              <a:t>Unit tests are designed to test individual sections of code.</a:t>
-            </a:r>
-          </a:p>
-          <a:p>
-            <a:r>
-              <a:rPr lang="en-US" dirty="0"/>
-              <a:t>Test stored procedures, functions, and assemblies in isolation.</a:t>
-            </a:r>
-          </a:p>
-          <a:p>
-            <a:r>
-              <a:rPr lang="en-US" dirty="0"/>
-              <a:t>Data is always consistent in a unit test</a:t>
-            </a:r>
-          </a:p>
-          <a:p>
-            <a:r>
-              <a:rPr lang="en-US" dirty="0"/>
-              <a:t>Tools</a:t>
+              <a:t>These are tests to ensure that code is consistent.</a:t>
+            </a:r>
+          </a:p>
+          <a:p>
+            <a:r>
+              <a:rPr lang="en-US" dirty="0"/>
+              <a:t>Can include naming, DRI, index requirements, poor programming patterns and more. </a:t>
+            </a:r>
+          </a:p>
+          <a:p>
+            <a:r>
+              <a:rPr lang="en-US" dirty="0"/>
+              <a:t>Testing Tools</a:t>
             </a:r>
           </a:p>
           <a:p>
             <a:pPr lvl="1"/>
             <a:r>
+              <a:rPr lang="en-US" dirty="0"/>
+              <a:t>SQL Cop -  </a:t>
+            </a:r>
+            <a:r>
               <a:rPr lang="en-US" dirty="0">
-                <a:hlinkClick r:id="rId2"/>
+                <a:hlinkClick r:id="rId3"/>
               </a:rPr>
-              <a:t>Microsoft Unit Testing</a:t>
+              <a:t>http://sqlcop.lessthandot.com/</a:t>
+            </a:r>
+            <a:r>
+              <a:rPr lang="en-US" dirty="0"/>
+              <a:t> </a:t>
+            </a:r>
+          </a:p>
+          <a:p>
+            <a:pPr lvl="1"/>
+            <a:r>
+              <a:rPr lang="en-US" dirty="0"/>
+              <a:t>SQL Code Guard - </a:t>
+            </a:r>
+            <a:r>
+              <a:rPr lang="en-US" dirty="0">
+                <a:hlinkClick r:id="rId4"/>
+              </a:rPr>
+              <a:t>https://sqlcodeguard.com/</a:t>
             </a:r>
             <a:endParaRPr lang="en-US" dirty="0"/>
           </a:p>
           <a:p>
             <a:pPr lvl="1"/>
             <a:r>
-              <a:rPr lang="en-US" dirty="0" err="1">
-                <a:hlinkClick r:id="rId3" action="ppaction://hlinkfile"/>
+              <a:rPr lang="en-US" dirty="0"/>
+              <a:t>SQL </a:t>
+            </a:r>
+            <a:r>
+              <a:rPr lang="en-US" dirty="0" err="1"/>
+              <a:t>Enlight</a:t>
+            </a:r>
+            <a:r>
+              <a:rPr lang="en-US" dirty="0"/>
+              <a:t> - </a:t>
+            </a:r>
+            <a:r>
+              <a:rPr lang="en-US" dirty="0">
+                <a:hlinkClick r:id="rId5"/>
               </a:rPr>
-              <a:t>tSQLt</a:t>
-            </a:r>
-            <a:endParaRPr lang="en-US" dirty="0"/>
+              <a:t>http://www.ubitsoft.com/products/sqlenlight/</a:t>
+            </a:r>
+            <a:r>
+              <a:rPr lang="en-US" dirty="0"/>
+              <a:t> </a:t>
+            </a:r>
           </a:p>
         </p:txBody>
       </p:sp>
     </p:spTree>
     <p:extLst>
       <p:ext uri="{BB962C8B-B14F-4D97-AF65-F5344CB8AC3E}">
-        <p14:creationId xmlns:p14="http://schemas.microsoft.com/office/powerpoint/2010/main" val="3226754207"/>
+        <p14:creationId xmlns:p14="http://schemas.microsoft.com/office/powerpoint/2010/main" val="3624326952"/>
       </p:ext>
     </p:extLst>
   </p:cSld>
@@ -5426,6 +6150,118 @@
 </file>
 
 <file path=ppt/slides/slide20.xml><?xml version="1.0" encoding="utf-8"?>
+<p:sld xmlns:a="http://schemas.openxmlformats.org/drawingml/2006/main" xmlns:r="http://schemas.openxmlformats.org/officeDocument/2006/relationships" xmlns:p="http://schemas.openxmlformats.org/presentationml/2006/main">
+  <p:cSld>
+    <p:spTree>
+      <p:nvGrpSpPr>
+        <p:cNvPr id="1" name=""/>
+        <p:cNvGrpSpPr/>
+        <p:nvPr/>
+      </p:nvGrpSpPr>
+      <p:grpSpPr>
+        <a:xfrm>
+          <a:off x="0" y="0"/>
+          <a:ext cx="0" cy="0"/>
+          <a:chOff x="0" y="0"/>
+          <a:chExt cx="0" cy="0"/>
+        </a:xfrm>
+      </p:grpSpPr>
+      <p:sp>
+        <p:nvSpPr>
+          <p:cNvPr id="2" name="Title 1"/>
+          <p:cNvSpPr>
+            <a:spLocks noGrp="1"/>
+          </p:cNvSpPr>
+          <p:nvPr>
+            <p:ph type="title"/>
+          </p:nvPr>
+        </p:nvSpPr>
+        <p:spPr/>
+        <p:txBody>
+          <a:bodyPr/>
+          <a:lstStyle/>
+          <a:p>
+            <a:r>
+              <a:rPr lang="en-US" dirty="0"/>
+              <a:t>Unit Tests</a:t>
+            </a:r>
+          </a:p>
+        </p:txBody>
+      </p:sp>
+      <p:sp>
+        <p:nvSpPr>
+          <p:cNvPr id="3" name="Content Placeholder 2"/>
+          <p:cNvSpPr>
+            <a:spLocks noGrp="1"/>
+          </p:cNvSpPr>
+          <p:nvPr>
+            <p:ph idx="1"/>
+          </p:nvPr>
+        </p:nvSpPr>
+        <p:spPr/>
+        <p:txBody>
+          <a:bodyPr/>
+          <a:lstStyle/>
+          <a:p>
+            <a:r>
+              <a:rPr lang="en-US" dirty="0"/>
+              <a:t>Unit tests are designed to test individual sections of code.</a:t>
+            </a:r>
+          </a:p>
+          <a:p>
+            <a:r>
+              <a:rPr lang="en-US" dirty="0"/>
+              <a:t>Test stored procedures, functions, and assemblies in isolation.</a:t>
+            </a:r>
+          </a:p>
+          <a:p>
+            <a:r>
+              <a:rPr lang="en-US" dirty="0"/>
+              <a:t>Data is always consistent in a unit test</a:t>
+            </a:r>
+          </a:p>
+          <a:p>
+            <a:r>
+              <a:rPr lang="en-US" dirty="0"/>
+              <a:t>Tools</a:t>
+            </a:r>
+          </a:p>
+          <a:p>
+            <a:pPr lvl="1"/>
+            <a:r>
+              <a:rPr lang="en-US" dirty="0">
+                <a:hlinkClick r:id="rId3"/>
+              </a:rPr>
+              <a:t>Microsoft Unit Testing</a:t>
+            </a:r>
+            <a:endParaRPr lang="en-US" dirty="0"/>
+          </a:p>
+          <a:p>
+            <a:pPr lvl="1"/>
+            <a:r>
+              <a:rPr lang="en-US" dirty="0" err="1">
+                <a:hlinkClick r:id="rId4" action="ppaction://hlinkfile"/>
+              </a:rPr>
+              <a:t>tSQLt</a:t>
+            </a:r>
+            <a:endParaRPr lang="en-US" dirty="0"/>
+          </a:p>
+        </p:txBody>
+      </p:sp>
+    </p:spTree>
+    <p:extLst>
+      <p:ext uri="{BB962C8B-B14F-4D97-AF65-F5344CB8AC3E}">
+        <p14:creationId xmlns:p14="http://schemas.microsoft.com/office/powerpoint/2010/main" val="3226754207"/>
+      </p:ext>
+    </p:extLst>
+  </p:cSld>
+  <p:clrMapOvr>
+    <a:masterClrMapping/>
+  </p:clrMapOvr>
+</p:sld>
+</file>
+
+<file path=ppt/slides/slide21.xml><?xml version="1.0" encoding="utf-8"?>
 <p:sld xmlns:a="http://schemas.openxmlformats.org/drawingml/2006/main" xmlns:r="http://schemas.openxmlformats.org/officeDocument/2006/relationships" xmlns:p="http://schemas.openxmlformats.org/presentationml/2006/main">
   <p:cSld>
     <p:spTree>

</xml_diff>